<commit_message>
added Category model and it's ModelAdmin
</commit_message>
<xml_diff>
--- a/FlowChart.pptx
+++ b/FlowChart.pptx
@@ -3703,20 +3703,6 @@
               </a:rPr>
               <a:t>Parent</a:t>
             </a:r>
-          </a:p>
-          <a:p>
-            <a:pPr marL="285750" indent="-285750">
-              <a:buFont typeface="Arial" panose="020B0604020202020204" pitchFamily="34" charset="0"/>
-              <a:buChar char="•"/>
-            </a:pPr>
-            <a:r>
-              <a:rPr lang="en-US" sz="1100" dirty="0" err="1" smtClean="0">
-                <a:solidFill>
-                  <a:schemeClr val="tx1"/>
-                </a:solidFill>
-              </a:rPr>
-              <a:t>Is_parent</a:t>
-            </a:r>
             <a:endParaRPr lang="en-US" sz="1100" dirty="0" smtClean="0">
               <a:solidFill>
                 <a:schemeClr val="tx1"/>
@@ -4865,11 +4851,6 @@
               </a:rPr>
               <a:t>Descriptions</a:t>
             </a:r>
-            <a:endParaRPr lang="en-US" sz="1100" dirty="0" smtClean="0">
-              <a:solidFill>
-                <a:schemeClr val="tx1"/>
-              </a:solidFill>
-            </a:endParaRPr>
           </a:p>
         </p:txBody>
       </p:sp>

</xml_diff>

<commit_message>
added CategoryForm to CategoryModelAdmin
</commit_message>
<xml_diff>
--- a/FlowChart.pptx
+++ b/FlowChart.pptx
@@ -245,7 +245,7 @@
           <a:p>
             <a:fld id="{961BFD74-761A-4B48-9C53-EA9EE3A1E55D}" type="datetimeFigureOut">
               <a:rPr lang="en-US" smtClean="0"/>
-              <a:t>11/3/2021</a:t>
+              <a:t>11/7/2021</a:t>
             </a:fld>
             <a:endParaRPr lang="en-US"/>
           </a:p>
@@ -415,7 +415,7 @@
           <a:p>
             <a:fld id="{961BFD74-761A-4B48-9C53-EA9EE3A1E55D}" type="datetimeFigureOut">
               <a:rPr lang="en-US" smtClean="0"/>
-              <a:t>11/3/2021</a:t>
+              <a:t>11/7/2021</a:t>
             </a:fld>
             <a:endParaRPr lang="en-US"/>
           </a:p>
@@ -595,7 +595,7 @@
           <a:p>
             <a:fld id="{961BFD74-761A-4B48-9C53-EA9EE3A1E55D}" type="datetimeFigureOut">
               <a:rPr lang="en-US" smtClean="0"/>
-              <a:t>11/3/2021</a:t>
+              <a:t>11/7/2021</a:t>
             </a:fld>
             <a:endParaRPr lang="en-US"/>
           </a:p>
@@ -765,7 +765,7 @@
           <a:p>
             <a:fld id="{961BFD74-761A-4B48-9C53-EA9EE3A1E55D}" type="datetimeFigureOut">
               <a:rPr lang="en-US" smtClean="0"/>
-              <a:t>11/3/2021</a:t>
+              <a:t>11/7/2021</a:t>
             </a:fld>
             <a:endParaRPr lang="en-US"/>
           </a:p>
@@ -1011,7 +1011,7 @@
           <a:p>
             <a:fld id="{961BFD74-761A-4B48-9C53-EA9EE3A1E55D}" type="datetimeFigureOut">
               <a:rPr lang="en-US" smtClean="0"/>
-              <a:t>11/3/2021</a:t>
+              <a:t>11/7/2021</a:t>
             </a:fld>
             <a:endParaRPr lang="en-US"/>
           </a:p>
@@ -1243,7 +1243,7 @@
           <a:p>
             <a:fld id="{961BFD74-761A-4B48-9C53-EA9EE3A1E55D}" type="datetimeFigureOut">
               <a:rPr lang="en-US" smtClean="0"/>
-              <a:t>11/3/2021</a:t>
+              <a:t>11/7/2021</a:t>
             </a:fld>
             <a:endParaRPr lang="en-US"/>
           </a:p>
@@ -1610,7 +1610,7 @@
           <a:p>
             <a:fld id="{961BFD74-761A-4B48-9C53-EA9EE3A1E55D}" type="datetimeFigureOut">
               <a:rPr lang="en-US" smtClean="0"/>
-              <a:t>11/3/2021</a:t>
+              <a:t>11/7/2021</a:t>
             </a:fld>
             <a:endParaRPr lang="en-US"/>
           </a:p>
@@ -1728,7 +1728,7 @@
           <a:p>
             <a:fld id="{961BFD74-761A-4B48-9C53-EA9EE3A1E55D}" type="datetimeFigureOut">
               <a:rPr lang="en-US" smtClean="0"/>
-              <a:t>11/3/2021</a:t>
+              <a:t>11/7/2021</a:t>
             </a:fld>
             <a:endParaRPr lang="en-US"/>
           </a:p>
@@ -1823,7 +1823,7 @@
           <a:p>
             <a:fld id="{961BFD74-761A-4B48-9C53-EA9EE3A1E55D}" type="datetimeFigureOut">
               <a:rPr lang="en-US" smtClean="0"/>
-              <a:t>11/3/2021</a:t>
+              <a:t>11/7/2021</a:t>
             </a:fld>
             <a:endParaRPr lang="en-US"/>
           </a:p>
@@ -2100,7 +2100,7 @@
           <a:p>
             <a:fld id="{961BFD74-761A-4B48-9C53-EA9EE3A1E55D}" type="datetimeFigureOut">
               <a:rPr lang="en-US" smtClean="0"/>
-              <a:t>11/3/2021</a:t>
+              <a:t>11/7/2021</a:t>
             </a:fld>
             <a:endParaRPr lang="en-US"/>
           </a:p>
@@ -2353,7 +2353,7 @@
           <a:p>
             <a:fld id="{961BFD74-761A-4B48-9C53-EA9EE3A1E55D}" type="datetimeFigureOut">
               <a:rPr lang="en-US" smtClean="0"/>
-              <a:t>11/3/2021</a:t>
+              <a:t>11/7/2021</a:t>
             </a:fld>
             <a:endParaRPr lang="en-US"/>
           </a:p>
@@ -2566,7 +2566,7 @@
           <a:p>
             <a:fld id="{961BFD74-761A-4B48-9C53-EA9EE3A1E55D}" type="datetimeFigureOut">
               <a:rPr lang="en-US" smtClean="0"/>
-              <a:t>11/3/2021</a:t>
+              <a:t>11/7/2021</a:t>
             </a:fld>
             <a:endParaRPr lang="en-US"/>
           </a:p>
@@ -3703,11 +3703,6 @@
               </a:rPr>
               <a:t>Parent</a:t>
             </a:r>
-            <a:endParaRPr lang="en-US" sz="1100" dirty="0" smtClean="0">
-              <a:solidFill>
-                <a:schemeClr val="tx1"/>
-              </a:solidFill>
-            </a:endParaRPr>
           </a:p>
         </p:txBody>
       </p:sp>
@@ -5687,6 +5682,327 @@
           <a:chExt cx="0" cy="0"/>
         </a:xfrm>
       </p:grpSpPr>
+      <p:sp>
+        <p:nvSpPr>
+          <p:cNvPr id="2" name="Rounded Rectangle 1"/>
+          <p:cNvSpPr/>
+          <p:nvPr/>
+        </p:nvSpPr>
+        <p:spPr>
+          <a:xfrm>
+            <a:off x="2776451" y="274320"/>
+            <a:ext cx="8387542" cy="5752407"/>
+          </a:xfrm>
+          <a:prstGeom prst="roundRect">
+            <a:avLst/>
+          </a:prstGeom>
+        </p:spPr>
+        <p:style>
+          <a:lnRef idx="2">
+            <a:schemeClr val="accent4">
+              <a:shade val="50000"/>
+            </a:schemeClr>
+          </a:lnRef>
+          <a:fillRef idx="1">
+            <a:schemeClr val="accent4"/>
+          </a:fillRef>
+          <a:effectRef idx="0">
+            <a:schemeClr val="accent4"/>
+          </a:effectRef>
+          <a:fontRef idx="minor">
+            <a:schemeClr val="lt1"/>
+          </a:fontRef>
+        </p:style>
+        <p:txBody>
+          <a:bodyPr rtlCol="0" anchor="ctr"/>
+          <a:lstStyle/>
+          <a:p>
+            <a:pPr algn="r" rtl="1"/>
+            <a:r>
+              <a:rPr lang="fa-IR" dirty="0">
+                <a:solidFill>
+                  <a:schemeClr val="tx1"/>
+                </a:solidFill>
+              </a:rPr>
+              <a:t>این موارد رو نیاز دارم داخل فایل پایتونی برام ارسال شه به دلیل عدم داشتن وقت :</a:t>
+            </a:r>
+          </a:p>
+          <a:p>
+            <a:pPr algn="r" rtl="1"/>
+            <a:r>
+              <a:rPr lang="fa-IR" dirty="0">
+                <a:solidFill>
+                  <a:schemeClr val="tx1"/>
+                </a:solidFill>
+              </a:rPr>
+              <a:t/>
+            </a:r>
+            <a:br>
+              <a:rPr lang="fa-IR" dirty="0">
+                <a:solidFill>
+                  <a:schemeClr val="tx1"/>
+                </a:solidFill>
+              </a:rPr>
+            </a:br>
+            <a:r>
+              <a:rPr lang="fa-IR" dirty="0">
+                <a:solidFill>
+                  <a:schemeClr val="tx1"/>
+                </a:solidFill>
+              </a:rPr>
+              <a:t>اولا از </a:t>
+            </a:r>
+            <a:r>
+              <a:rPr lang="en-US" dirty="0">
+                <a:solidFill>
+                  <a:schemeClr val="tx1"/>
+                </a:solidFill>
+              </a:rPr>
+              <a:t>base user </a:t>
+            </a:r>
+            <a:r>
+              <a:rPr lang="en-US" dirty="0" err="1">
+                <a:solidFill>
+                  <a:schemeClr val="tx1"/>
+                </a:solidFill>
+              </a:rPr>
+              <a:t>django</a:t>
+            </a:r>
+            <a:r>
+              <a:rPr lang="en-US" dirty="0">
+                <a:solidFill>
+                  <a:schemeClr val="tx1"/>
+                </a:solidFill>
+              </a:rPr>
+              <a:t> </a:t>
+            </a:r>
+            <a:r>
+              <a:rPr lang="fa-IR" dirty="0">
+                <a:solidFill>
+                  <a:schemeClr val="tx1"/>
+                </a:solidFill>
+              </a:rPr>
+              <a:t>استفاده میکنم داخل پروژه </a:t>
+            </a:r>
+          </a:p>
+          <a:p>
+            <a:pPr algn="r" rtl="1"/>
+            <a:r>
+              <a:rPr lang="fa-IR" dirty="0">
+                <a:solidFill>
+                  <a:schemeClr val="tx1"/>
+                </a:solidFill>
+              </a:rPr>
+              <a:t>۱. فرم ثبت نام به همراه ولیدتور رمز عبور (رمز شامل حرف کوچیک / بزرگ / فقط </a:t>
+            </a:r>
+            <a:r>
+              <a:rPr lang="en-US" dirty="0" err="1">
+                <a:solidFill>
+                  <a:schemeClr val="tx1"/>
+                </a:solidFill>
+              </a:rPr>
+              <a:t>ascii</a:t>
+            </a:r>
+            <a:r>
+              <a:rPr lang="en-US" dirty="0">
+                <a:solidFill>
+                  <a:schemeClr val="tx1"/>
+                </a:solidFill>
+              </a:rPr>
+              <a:t>)    ( </a:t>
+            </a:r>
+            <a:r>
+              <a:rPr lang="fa-IR" dirty="0">
+                <a:solidFill>
+                  <a:schemeClr val="tx1"/>
+                </a:solidFill>
+              </a:rPr>
+              <a:t>یوزر فقط کوچیک باشه / فقط </a:t>
+            </a:r>
+            <a:r>
+              <a:rPr lang="en-US" dirty="0" err="1">
+                <a:solidFill>
+                  <a:schemeClr val="tx1"/>
+                </a:solidFill>
+              </a:rPr>
+              <a:t>ascii</a:t>
+            </a:r>
+            <a:r>
+              <a:rPr lang="en-US" dirty="0">
+                <a:solidFill>
+                  <a:schemeClr val="tx1"/>
+                </a:solidFill>
+              </a:rPr>
+              <a:t> ) </a:t>
+            </a:r>
+          </a:p>
+          <a:p>
+            <a:pPr algn="r" rtl="1"/>
+            <a:r>
+              <a:rPr lang="en-US" dirty="0">
+                <a:solidFill>
+                  <a:schemeClr val="tx1"/>
+                </a:solidFill>
+              </a:rPr>
+              <a:t>(</a:t>
+            </a:r>
+            <a:r>
+              <a:rPr lang="fa-IR" dirty="0">
+                <a:solidFill>
+                  <a:schemeClr val="tx1"/>
+                </a:solidFill>
+              </a:rPr>
+              <a:t>اگه ایمیل یا یوزرنیم تکراری بود </a:t>
+            </a:r>
+            <a:r>
+              <a:rPr lang="en-US" dirty="0" err="1">
+                <a:solidFill>
+                  <a:schemeClr val="tx1"/>
+                </a:solidFill>
+              </a:rPr>
+              <a:t>messages.warning</a:t>
+            </a:r>
+            <a:r>
+              <a:rPr lang="en-US" dirty="0">
+                <a:solidFill>
+                  <a:schemeClr val="tx1"/>
+                </a:solidFill>
+              </a:rPr>
+              <a:t> </a:t>
+            </a:r>
+            <a:r>
+              <a:rPr lang="fa-IR" dirty="0">
+                <a:solidFill>
+                  <a:schemeClr val="tx1"/>
+                </a:solidFill>
+              </a:rPr>
+              <a:t>بده که یکی از این دوتا تکراریه)</a:t>
+            </a:r>
+          </a:p>
+          <a:p>
+            <a:pPr algn="r" rtl="1"/>
+            <a:r>
+              <a:rPr lang="fa-IR" dirty="0">
+                <a:solidFill>
+                  <a:schemeClr val="tx1"/>
+                </a:solidFill>
+              </a:rPr>
+              <a:t>۲. ریست پسوورد --&gt; ایمیل کاربر رو بگیره و براش ریست رمز عبور رو ارسال کنه که ۱ ساعت ولید باشه لینکش / اگه کاربر با اون ایمیل وجود نداشت بازم بگه ایمیل ارسال شد ولی ایمیلی ارسال نکنه. ( به منظور مهندسی معکوس نکردن برای </a:t>
+            </a:r>
+            <a:r>
+              <a:rPr lang="en-US" dirty="0">
+                <a:solidFill>
+                  <a:schemeClr val="tx1"/>
+                </a:solidFill>
+              </a:rPr>
+              <a:t>brute force )</a:t>
+            </a:r>
+          </a:p>
+          <a:p>
+            <a:pPr algn="r" rtl="1"/>
+            <a:r>
+              <a:rPr lang="en-US" dirty="0">
+                <a:solidFill>
+                  <a:schemeClr val="tx1"/>
+                </a:solidFill>
+              </a:rPr>
+              <a:t/>
+            </a:r>
+            <a:br>
+              <a:rPr lang="en-US" dirty="0">
+                <a:solidFill>
+                  <a:schemeClr val="tx1"/>
+                </a:solidFill>
+              </a:rPr>
+            </a:br>
+            <a:endParaRPr lang="en-US" dirty="0">
+              <a:solidFill>
+                <a:schemeClr val="tx1"/>
+              </a:solidFill>
+            </a:endParaRPr>
+          </a:p>
+          <a:p>
+            <a:pPr algn="r" rtl="1"/>
+            <a:r>
+              <a:rPr lang="fa-IR" dirty="0">
+                <a:solidFill>
+                  <a:schemeClr val="tx1"/>
+                </a:solidFill>
+              </a:rPr>
+              <a:t>۳. ایمیل فعال سازی --&gt; خودکار بعد از ثبت نام ایمیل رو ارسال کنه. ارسال ایمیل رو داخل یک تابع قرار بدید که ورودی ایمیل رو بگیره چون میخوام اون رو داخل سلری در آینده قرار بدم. پس تمام کد نباید تو </a:t>
+            </a:r>
+            <a:r>
+              <a:rPr lang="en-US" dirty="0">
+                <a:solidFill>
+                  <a:schemeClr val="tx1"/>
+                </a:solidFill>
+              </a:rPr>
+              <a:t>view </a:t>
+            </a:r>
+            <a:r>
+              <a:rPr lang="fa-IR" dirty="0">
+                <a:solidFill>
+                  <a:schemeClr val="tx1"/>
+                </a:solidFill>
+              </a:rPr>
+              <a:t>باشه و تو </a:t>
+            </a:r>
+            <a:r>
+              <a:rPr lang="en-US" dirty="0">
+                <a:solidFill>
+                  <a:schemeClr val="tx1"/>
+                </a:solidFill>
+              </a:rPr>
+              <a:t>view </a:t>
+            </a:r>
+            <a:r>
+              <a:rPr lang="fa-IR" dirty="0">
+                <a:solidFill>
+                  <a:schemeClr val="tx1"/>
+                </a:solidFill>
+              </a:rPr>
+              <a:t>فقط یک تابع صدا زده شه که ایمیل رو ارسال کنه و </a:t>
+            </a:r>
+            <a:r>
+              <a:rPr lang="en-US" dirty="0" err="1">
+                <a:solidFill>
+                  <a:schemeClr val="tx1"/>
+                </a:solidFill>
+              </a:rPr>
+              <a:t>messages.success</a:t>
+            </a:r>
+            <a:r>
+              <a:rPr lang="en-US" dirty="0">
+                <a:solidFill>
+                  <a:schemeClr val="tx1"/>
+                </a:solidFill>
+              </a:rPr>
+              <a:t> </a:t>
+            </a:r>
+            <a:r>
+              <a:rPr lang="fa-IR" dirty="0">
+                <a:solidFill>
+                  <a:schemeClr val="tx1"/>
+                </a:solidFill>
+              </a:rPr>
+              <a:t>کنه که ایمیل ارسال شد</a:t>
+            </a:r>
+            <a:r>
+              <a:rPr lang="fa-IR" dirty="0" smtClean="0">
+                <a:solidFill>
+                  <a:schemeClr val="tx1"/>
+                </a:solidFill>
+              </a:rPr>
+              <a:t>.</a:t>
+            </a:r>
+            <a:endParaRPr lang="fa-IR" dirty="0">
+              <a:solidFill>
+                <a:schemeClr val="tx1"/>
+              </a:solidFill>
+            </a:endParaRPr>
+          </a:p>
+        </p:txBody>
+      </p:sp>
     </p:spTree>
     <p:extLst>
       <p:ext uri="{BB962C8B-B14F-4D97-AF65-F5344CB8AC3E}">

</xml_diff>